<commit_message>
working on prague presentations
</commit_message>
<xml_diff>
--- a/Academic Work/presentations/prague/Evolve - Advanced.pptx
+++ b/Academic Work/presentations/prague/Evolve - Advanced.pptx
@@ -5,7 +5,7 @@
     <p:sldMasterId id="2147484032" r:id="rId1"/>
   </p:sldMasterIdLst>
   <p:notesMasterIdLst>
-    <p:notesMasterId r:id="rId11"/>
+    <p:notesMasterId r:id="rId21"/>
   </p:notesMasterIdLst>
   <p:sldIdLst>
     <p:sldId id="256" r:id="rId2"/>
@@ -13,10 +13,20 @@
     <p:sldId id="282" r:id="rId4"/>
     <p:sldId id="259" r:id="rId5"/>
     <p:sldId id="286" r:id="rId6"/>
-    <p:sldId id="285" r:id="rId7"/>
-    <p:sldId id="287" r:id="rId8"/>
-    <p:sldId id="288" r:id="rId9"/>
-    <p:sldId id="281" r:id="rId10"/>
+    <p:sldId id="289" r:id="rId7"/>
+    <p:sldId id="290" r:id="rId8"/>
+    <p:sldId id="291" r:id="rId9"/>
+    <p:sldId id="292" r:id="rId10"/>
+    <p:sldId id="293" r:id="rId11"/>
+    <p:sldId id="294" r:id="rId12"/>
+    <p:sldId id="287" r:id="rId13"/>
+    <p:sldId id="288" r:id="rId14"/>
+    <p:sldId id="297" r:id="rId15"/>
+    <p:sldId id="296" r:id="rId16"/>
+    <p:sldId id="301" r:id="rId17"/>
+    <p:sldId id="298" r:id="rId18"/>
+    <p:sldId id="299" r:id="rId19"/>
+    <p:sldId id="300" r:id="rId20"/>
   </p:sldIdLst>
   <p:sldSz cx="9144000" cy="6858000" type="screen4x3"/>
   <p:notesSz cx="9144000" cy="6858000"/>
@@ -201,7 +211,7 @@
             <a:fld id="{CC899B31-23B7-41FA-A7A8-47EAF8E80A0A}" type="datetimeFigureOut">
               <a:rPr lang="en-US" smtClean="0"/>
               <a:pPr/>
-              <a:t>1/30/2011</a:t>
+              <a:t>2/1/2011</a:t>
             </a:fld>
             <a:endParaRPr lang="en-GB"/>
           </a:p>
@@ -467,6 +477,183 @@
 </p:notesMaster>
 </file>
 
+<file path=ppt/notesSlides/notesSlide1.xml><?xml version="1.0" encoding="utf-8"?>
+<p:notes xmlns:a="http://schemas.openxmlformats.org/drawingml/2006/main" xmlns:r="http://schemas.openxmlformats.org/officeDocument/2006/relationships" xmlns:p="http://schemas.openxmlformats.org/presentationml/2006/main">
+  <p:cSld>
+    <p:spTree>
+      <p:nvGrpSpPr>
+        <p:cNvPr id="1" name=""/>
+        <p:cNvGrpSpPr/>
+        <p:nvPr/>
+      </p:nvGrpSpPr>
+      <p:grpSpPr>
+        <a:xfrm>
+          <a:off x="0" y="0"/>
+          <a:ext cx="0" cy="0"/>
+          <a:chOff x="0" y="0"/>
+          <a:chExt cx="0" cy="0"/>
+        </a:xfrm>
+      </p:grpSpPr>
+      <p:sp>
+        <p:nvSpPr>
+          <p:cNvPr id="2" name="Slide Image Placeholder 1"/>
+          <p:cNvSpPr>
+            <a:spLocks noGrp="1" noRot="1" noChangeAspect="1"/>
+          </p:cNvSpPr>
+          <p:nvPr>
+            <p:ph type="sldImg"/>
+          </p:nvPr>
+        </p:nvSpPr>
+        <p:spPr>
+          <a:xfrm>
+            <a:off x="1714500" y="142875"/>
+            <a:ext cx="5715000" cy="4286250"/>
+          </a:xfrm>
+        </p:spPr>
+      </p:sp>
+      <p:sp>
+        <p:nvSpPr>
+          <p:cNvPr id="3" name="Notes Placeholder 2"/>
+          <p:cNvSpPr>
+            <a:spLocks noGrp="1"/>
+          </p:cNvSpPr>
+          <p:nvPr>
+            <p:ph type="body" idx="1"/>
+          </p:nvPr>
+        </p:nvSpPr>
+        <p:spPr/>
+        <p:txBody>
+          <a:bodyPr>
+            <a:normAutofit/>
+          </a:bodyPr>
+          <a:lstStyle/>
+          <a:p>
+            <a:endParaRPr lang="en-GB" dirty="0"/>
+          </a:p>
+        </p:txBody>
+      </p:sp>
+      <p:sp>
+        <p:nvSpPr>
+          <p:cNvPr id="4" name="Slide Number Placeholder 3"/>
+          <p:cNvSpPr>
+            <a:spLocks noGrp="1"/>
+          </p:cNvSpPr>
+          <p:nvPr>
+            <p:ph type="sldNum" sz="quarter" idx="10"/>
+          </p:nvPr>
+        </p:nvSpPr>
+        <p:spPr/>
+        <p:txBody>
+          <a:bodyPr/>
+          <a:lstStyle/>
+          <a:p>
+            <a:fld id="{091399BD-5632-4612-98AC-0049671A5341}" type="slidenum">
+              <a:rPr lang="en-GB" smtClean="0"/>
+              <a:pPr/>
+              <a:t>2</a:t>
+            </a:fld>
+            <a:endParaRPr lang="en-GB"/>
+          </a:p>
+        </p:txBody>
+      </p:sp>
+    </p:spTree>
+  </p:cSld>
+  <p:clrMapOvr>
+    <a:masterClrMapping/>
+  </p:clrMapOvr>
+</p:notes>
+</file>
+
+<file path=ppt/notesSlides/notesSlide2.xml><?xml version="1.0" encoding="utf-8"?>
+<p:notes xmlns:a="http://schemas.openxmlformats.org/drawingml/2006/main" xmlns:r="http://schemas.openxmlformats.org/officeDocument/2006/relationships" xmlns:p="http://schemas.openxmlformats.org/presentationml/2006/main">
+  <p:cSld>
+    <p:spTree>
+      <p:nvGrpSpPr>
+        <p:cNvPr id="1" name=""/>
+        <p:cNvGrpSpPr/>
+        <p:nvPr/>
+      </p:nvGrpSpPr>
+      <p:grpSpPr>
+        <a:xfrm>
+          <a:off x="0" y="0"/>
+          <a:ext cx="0" cy="0"/>
+          <a:chOff x="0" y="0"/>
+          <a:chExt cx="0" cy="0"/>
+        </a:xfrm>
+      </p:grpSpPr>
+      <p:sp>
+        <p:nvSpPr>
+          <p:cNvPr id="2" name="Slide Image Placeholder 1"/>
+          <p:cNvSpPr>
+            <a:spLocks noGrp="1" noRot="1" noChangeAspect="1"/>
+          </p:cNvSpPr>
+          <p:nvPr>
+            <p:ph type="sldImg"/>
+          </p:nvPr>
+        </p:nvSpPr>
+        <p:spPr/>
+      </p:sp>
+      <p:sp>
+        <p:nvSpPr>
+          <p:cNvPr id="3" name="Notes Placeholder 2"/>
+          <p:cNvSpPr>
+            <a:spLocks noGrp="1"/>
+          </p:cNvSpPr>
+          <p:nvPr>
+            <p:ph type="body" idx="1"/>
+          </p:nvPr>
+        </p:nvSpPr>
+        <p:spPr/>
+        <p:txBody>
+          <a:bodyPr>
+            <a:normAutofit/>
+          </a:bodyPr>
+          <a:lstStyle/>
+          <a:p>
+            <a:r>
+              <a:rPr lang="en-GB" dirty="0" smtClean="0"/>
+              <a:t>Cost of older system is proportional to</a:t>
+            </a:r>
+            <a:r>
+              <a:rPr lang="en-GB" baseline="0" dirty="0" smtClean="0"/>
+              <a:t> age</a:t>
+            </a:r>
+            <a:endParaRPr lang="en-GB" dirty="0"/>
+          </a:p>
+        </p:txBody>
+      </p:sp>
+      <p:sp>
+        <p:nvSpPr>
+          <p:cNvPr id="4" name="Slide Number Placeholder 3"/>
+          <p:cNvSpPr>
+            <a:spLocks noGrp="1"/>
+          </p:cNvSpPr>
+          <p:nvPr>
+            <p:ph type="sldNum" sz="quarter" idx="10"/>
+          </p:nvPr>
+        </p:nvSpPr>
+        <p:spPr/>
+        <p:txBody>
+          <a:bodyPr/>
+          <a:lstStyle/>
+          <a:p>
+            <a:fld id="{091399BD-5632-4612-98AC-0049671A5341}" type="slidenum">
+              <a:rPr lang="en-GB" smtClean="0"/>
+              <a:pPr/>
+              <a:t>17</a:t>
+            </a:fld>
+            <a:endParaRPr lang="en-GB"/>
+          </a:p>
+        </p:txBody>
+      </p:sp>
+    </p:spTree>
+  </p:cSld>
+  <p:clrMapOvr>
+    <a:masterClrMapping/>
+  </p:clrMapOvr>
+</p:notes>
+</file>
+
 <file path=ppt/slideLayouts/slideLayout1.xml><?xml version="1.0" encoding="utf-8"?>
 <p:sldLayout xmlns:a="http://schemas.openxmlformats.org/drawingml/2006/main" xmlns:r="http://schemas.openxmlformats.org/officeDocument/2006/relationships" xmlns:p="http://schemas.openxmlformats.org/presentationml/2006/main" type="title" preserve="1">
   <p:cSld name="Title Slide">
@@ -810,7 +997,7 @@
             <a:fld id="{80205730-B28B-4293-938B-A508842901A8}" type="datetimeFigureOut">
               <a:rPr lang="en-US" smtClean="0"/>
               <a:pPr/>
-              <a:t>1/30/2011</a:t>
+              <a:t>2/1/2011</a:t>
             </a:fld>
             <a:endParaRPr lang="en-GB"/>
           </a:p>
@@ -995,7 +1182,7 @@
             <a:fld id="{80205730-B28B-4293-938B-A508842901A8}" type="datetimeFigureOut">
               <a:rPr lang="en-US" smtClean="0"/>
               <a:pPr/>
-              <a:t>1/30/2011</a:t>
+              <a:t>2/1/2011</a:t>
             </a:fld>
             <a:endParaRPr lang="en-GB"/>
           </a:p>
@@ -1392,7 +1579,7 @@
             <a:fld id="{80205730-B28B-4293-938B-A508842901A8}" type="datetimeFigureOut">
               <a:rPr lang="en-US" smtClean="0"/>
               <a:pPr/>
-              <a:t>1/30/2011</a:t>
+              <a:t>2/1/2011</a:t>
             </a:fld>
             <a:endParaRPr lang="en-GB"/>
           </a:p>
@@ -1666,7 +1853,7 @@
             <a:fld id="{80205730-B28B-4293-938B-A508842901A8}" type="datetimeFigureOut">
               <a:rPr lang="en-US" smtClean="0"/>
               <a:pPr/>
-              <a:t>1/30/2011</a:t>
+              <a:t>2/1/2011</a:t>
             </a:fld>
             <a:endParaRPr lang="en-GB"/>
           </a:p>
@@ -2054,7 +2241,7 @@
             <a:fld id="{80205730-B28B-4293-938B-A508842901A8}" type="datetimeFigureOut">
               <a:rPr lang="en-US" smtClean="0"/>
               <a:pPr/>
-              <a:t>1/30/2011</a:t>
+              <a:t>2/1/2011</a:t>
             </a:fld>
             <a:endParaRPr lang="en-GB"/>
           </a:p>
@@ -2214,7 +2401,7 @@
             <a:fld id="{80205730-B28B-4293-938B-A508842901A8}" type="datetimeFigureOut">
               <a:rPr lang="en-US" smtClean="0"/>
               <a:pPr/>
-              <a:t>1/30/2011</a:t>
+              <a:t>2/1/2011</a:t>
             </a:fld>
             <a:endParaRPr lang="en-GB"/>
           </a:p>
@@ -2314,7 +2501,7 @@
             <a:fld id="{80205730-B28B-4293-938B-A508842901A8}" type="datetimeFigureOut">
               <a:rPr lang="en-US" smtClean="0"/>
               <a:pPr/>
-              <a:t>1/30/2011</a:t>
+              <a:t>2/1/2011</a:t>
             </a:fld>
             <a:endParaRPr lang="en-GB"/>
           </a:p>
@@ -2585,7 +2772,7 @@
             <a:fld id="{80205730-B28B-4293-938B-A508842901A8}" type="datetimeFigureOut">
               <a:rPr lang="en-US" smtClean="0"/>
               <a:pPr/>
-              <a:t>1/30/2011</a:t>
+              <a:t>2/1/2011</a:t>
             </a:fld>
             <a:endParaRPr lang="en-GB"/>
           </a:p>
@@ -2883,7 +3070,7 @@
             <a:fld id="{80205730-B28B-4293-938B-A508842901A8}" type="datetimeFigureOut">
               <a:rPr lang="en-US" smtClean="0"/>
               <a:pPr/>
-              <a:t>1/30/2011</a:t>
+              <a:t>2/1/2011</a:t>
             </a:fld>
             <a:endParaRPr lang="en-GB"/>
           </a:p>
@@ -4051,21 +4238,80 @@
               <a:rPr lang="en-GB" dirty="0" smtClean="0"/>
               <a:t>			</a:t>
             </a:r>
-            <a:r>
-              <a:rPr lang="en-GB" dirty="0" smtClean="0"/>
-              <a:t>Overview of formal </a:t>
-            </a:r>
-            <a:r>
-              <a:rPr lang="en-GB" dirty="0" smtClean="0"/>
-              <a:t>model</a:t>
-            </a:r>
-          </a:p>
-          <a:p>
-            <a:r>
-              <a:rPr lang="en-GB" dirty="0" smtClean="0"/>
-              <a:t>&amp; advanced features</a:t>
-            </a:r>
             <a:endParaRPr lang="en-GB" dirty="0"/>
+          </a:p>
+        </p:txBody>
+      </p:sp>
+      <p:sp>
+        <p:nvSpPr>
+          <p:cNvPr id="4" name="TextBox 3"/>
+          <p:cNvSpPr txBox="1"/>
+          <p:nvPr/>
+        </p:nvSpPr>
+        <p:spPr>
+          <a:xfrm>
+            <a:off x="214282" y="4929198"/>
+            <a:ext cx="2554610" cy="1200329"/>
+          </a:xfrm>
+          <a:prstGeom prst="rect">
+            <a:avLst/>
+          </a:prstGeom>
+          <a:noFill/>
+        </p:spPr>
+        <p:txBody>
+          <a:bodyPr wrap="none" rtlCol="0">
+            <a:spAutoFit/>
+          </a:bodyPr>
+          <a:lstStyle/>
+          <a:p>
+            <a:r>
+              <a:rPr lang="en-GB" dirty="0" smtClean="0">
+                <a:solidFill>
+                  <a:schemeClr val="bg1"/>
+                </a:solidFill>
+              </a:rPr>
+              <a:t>Andrew McVeigh</a:t>
+            </a:r>
+          </a:p>
+          <a:p>
+            <a:r>
+              <a:rPr lang="en-GB" dirty="0" smtClean="0">
+                <a:solidFill>
+                  <a:schemeClr val="bg1"/>
+                </a:solidFill>
+              </a:rPr>
+              <a:t>Jeff Magee</a:t>
+            </a:r>
+          </a:p>
+          <a:p>
+            <a:r>
+              <a:rPr lang="en-GB" dirty="0" smtClean="0">
+                <a:solidFill>
+                  <a:schemeClr val="bg1"/>
+                </a:solidFill>
+              </a:rPr>
+              <a:t>Jeff Kramer</a:t>
+            </a:r>
+            <a:endParaRPr lang="en-GB" b="1" dirty="0" smtClean="0">
+              <a:solidFill>
+                <a:schemeClr val="bg1"/>
+              </a:solidFill>
+            </a:endParaRPr>
+          </a:p>
+          <a:p>
+            <a:r>
+              <a:rPr lang="en-GB" b="1" dirty="0" smtClean="0">
+                <a:solidFill>
+                  <a:schemeClr val="bg1"/>
+                </a:solidFill>
+              </a:rPr>
+              <a:t>Imperial College, London</a:t>
+            </a:r>
+            <a:endParaRPr lang="en-GB" b="1" dirty="0">
+              <a:solidFill>
+                <a:schemeClr val="bg1"/>
+              </a:solidFill>
+            </a:endParaRPr>
           </a:p>
         </p:txBody>
       </p:sp>
@@ -4081,6 +4327,899 @@
       </p:par>
     </p:tnLst>
   </p:timing>
+</p:sld>
+</file>
+
+<file path=ppt/slides/slide10.xml><?xml version="1.0" encoding="utf-8"?>
+<p:sld xmlns:a="http://schemas.openxmlformats.org/drawingml/2006/main" xmlns:r="http://schemas.openxmlformats.org/officeDocument/2006/relationships" xmlns:p="http://schemas.openxmlformats.org/presentationml/2006/main">
+  <p:cSld>
+    <p:spTree>
+      <p:nvGrpSpPr>
+        <p:cNvPr id="1" name=""/>
+        <p:cNvGrpSpPr/>
+        <p:nvPr/>
+      </p:nvGrpSpPr>
+      <p:grpSpPr>
+        <a:xfrm>
+          <a:off x="0" y="0"/>
+          <a:ext cx="0" cy="0"/>
+          <a:chOff x="0" y="0"/>
+          <a:chExt cx="0" cy="0"/>
+        </a:xfrm>
+      </p:grpSpPr>
+      <p:sp>
+        <p:nvSpPr>
+          <p:cNvPr id="4" name="Title 3"/>
+          <p:cNvSpPr>
+            <a:spLocks noGrp="1"/>
+          </p:cNvSpPr>
+          <p:nvPr>
+            <p:ph type="title"/>
+          </p:nvPr>
+        </p:nvSpPr>
+        <p:spPr/>
+        <p:txBody>
+          <a:bodyPr/>
+          <a:lstStyle/>
+          <a:p>
+            <a:r>
+              <a:rPr lang="en-GB" dirty="0" smtClean="0"/>
+              <a:t>State Machines</a:t>
+            </a:r>
+            <a:endParaRPr lang="en-GB" dirty="0"/>
+          </a:p>
+        </p:txBody>
+      </p:sp>
+      <p:sp>
+        <p:nvSpPr>
+          <p:cNvPr id="5" name="Content Placeholder 4"/>
+          <p:cNvSpPr>
+            <a:spLocks noGrp="1"/>
+          </p:cNvSpPr>
+          <p:nvPr>
+            <p:ph idx="1"/>
+          </p:nvPr>
+        </p:nvSpPr>
+        <p:spPr/>
+        <p:txBody>
+          <a:bodyPr/>
+          <a:lstStyle/>
+          <a:p>
+            <a:r>
+              <a:rPr lang="en-GB" dirty="0" smtClean="0"/>
+              <a:t>Just components with a notion of current state</a:t>
+            </a:r>
+          </a:p>
+          <a:p>
+            <a:pPr lvl="1"/>
+            <a:r>
+              <a:rPr lang="en-GB" dirty="0" smtClean="0"/>
+              <a:t>Big switch</a:t>
+            </a:r>
+          </a:p>
+          <a:p>
+            <a:pPr lvl="1"/>
+            <a:r>
+              <a:rPr lang="en-GB" dirty="0" smtClean="0"/>
+              <a:t>Different graphical presentation</a:t>
+            </a:r>
+          </a:p>
+          <a:p>
+            <a:pPr lvl="1"/>
+            <a:r>
+              <a:rPr lang="en-GB" dirty="0" smtClean="0"/>
+              <a:t>Use with resemblance and evolution</a:t>
+            </a:r>
+          </a:p>
+          <a:p>
+            <a:pPr lvl="1"/>
+            <a:r>
+              <a:rPr lang="en-GB" dirty="0" smtClean="0"/>
+              <a:t>Combine with conventional components</a:t>
+            </a:r>
+          </a:p>
+          <a:p>
+            <a:pPr lvl="1"/>
+            <a:endParaRPr lang="en-GB" dirty="0" smtClean="0"/>
+          </a:p>
+          <a:p>
+            <a:r>
+              <a:rPr lang="en-GB" dirty="0" smtClean="0"/>
+              <a:t>Advantages over OO approach</a:t>
+            </a:r>
+          </a:p>
+          <a:p>
+            <a:pPr lvl="1"/>
+            <a:r>
+              <a:rPr lang="en-GB" dirty="0" smtClean="0"/>
+              <a:t>Explicit transitions</a:t>
+            </a:r>
+          </a:p>
+          <a:p>
+            <a:pPr lvl="1"/>
+            <a:r>
+              <a:rPr lang="en-GB" dirty="0" smtClean="0"/>
+              <a:t>Extensible for states and transitions</a:t>
+            </a:r>
+          </a:p>
+          <a:p>
+            <a:pPr lvl="1"/>
+            <a:r>
+              <a:rPr lang="en-GB" dirty="0" smtClean="0"/>
+              <a:t>Rich context available for each state</a:t>
+            </a:r>
+          </a:p>
+          <a:p>
+            <a:pPr lvl="1"/>
+            <a:endParaRPr lang="en-GB" dirty="0" smtClean="0"/>
+          </a:p>
+          <a:p>
+            <a:endParaRPr lang="en-GB" dirty="0"/>
+          </a:p>
+        </p:txBody>
+      </p:sp>
+    </p:spTree>
+  </p:cSld>
+  <p:clrMapOvr>
+    <a:masterClrMapping/>
+  </p:clrMapOvr>
+</p:sld>
+</file>
+
+<file path=ppt/slides/slide11.xml><?xml version="1.0" encoding="utf-8"?>
+<p:sld xmlns:a="http://schemas.openxmlformats.org/drawingml/2006/main" xmlns:r="http://schemas.openxmlformats.org/officeDocument/2006/relationships" xmlns:p="http://schemas.openxmlformats.org/presentationml/2006/main">
+  <p:cSld>
+    <p:spTree>
+      <p:nvGrpSpPr>
+        <p:cNvPr id="1" name=""/>
+        <p:cNvGrpSpPr/>
+        <p:nvPr/>
+      </p:nvGrpSpPr>
+      <p:grpSpPr>
+        <a:xfrm>
+          <a:off x="0" y="0"/>
+          <a:ext cx="0" cy="0"/>
+          <a:chOff x="0" y="0"/>
+          <a:chExt cx="0" cy="0"/>
+        </a:xfrm>
+      </p:grpSpPr>
+      <p:sp>
+        <p:nvSpPr>
+          <p:cNvPr id="2" name="Title 1"/>
+          <p:cNvSpPr>
+            <a:spLocks noGrp="1"/>
+          </p:cNvSpPr>
+          <p:nvPr>
+            <p:ph type="title"/>
+          </p:nvPr>
+        </p:nvSpPr>
+        <p:spPr/>
+        <p:txBody>
+          <a:bodyPr/>
+          <a:lstStyle/>
+          <a:p>
+            <a:r>
+              <a:rPr lang="en-GB" dirty="0" smtClean="0"/>
+              <a:t>State machines (2)</a:t>
+            </a:r>
+            <a:endParaRPr lang="en-GB" dirty="0"/>
+          </a:p>
+        </p:txBody>
+      </p:sp>
+      <p:sp>
+        <p:nvSpPr>
+          <p:cNvPr id="3" name="Content Placeholder 2"/>
+          <p:cNvSpPr>
+            <a:spLocks noGrp="1"/>
+          </p:cNvSpPr>
+          <p:nvPr>
+            <p:ph idx="1"/>
+          </p:nvPr>
+        </p:nvSpPr>
+        <p:spPr/>
+        <p:txBody>
+          <a:bodyPr/>
+          <a:lstStyle/>
+          <a:p>
+            <a:r>
+              <a:rPr lang="en-GB" dirty="0" smtClean="0"/>
+              <a:t>Show...</a:t>
+            </a:r>
+            <a:endParaRPr lang="en-GB" dirty="0"/>
+          </a:p>
+        </p:txBody>
+      </p:sp>
+    </p:spTree>
+  </p:cSld>
+  <p:clrMapOvr>
+    <a:masterClrMapping/>
+  </p:clrMapOvr>
+</p:sld>
+</file>
+
+<file path=ppt/slides/slide12.xml><?xml version="1.0" encoding="utf-8"?>
+<p:sld xmlns:a="http://schemas.openxmlformats.org/drawingml/2006/main" xmlns:r="http://schemas.openxmlformats.org/officeDocument/2006/relationships" xmlns:p="http://schemas.openxmlformats.org/presentationml/2006/main">
+  <p:cSld>
+    <p:spTree>
+      <p:nvGrpSpPr>
+        <p:cNvPr id="1" name=""/>
+        <p:cNvGrpSpPr/>
+        <p:nvPr/>
+      </p:nvGrpSpPr>
+      <p:grpSpPr>
+        <a:xfrm>
+          <a:off x="0" y="0"/>
+          <a:ext cx="0" cy="0"/>
+          <a:chOff x="0" y="0"/>
+          <a:chExt cx="0" cy="0"/>
+        </a:xfrm>
+      </p:grpSpPr>
+      <p:sp>
+        <p:nvSpPr>
+          <p:cNvPr id="4" name="Title 3"/>
+          <p:cNvSpPr>
+            <a:spLocks noGrp="1"/>
+          </p:cNvSpPr>
+          <p:nvPr>
+            <p:ph type="title"/>
+          </p:nvPr>
+        </p:nvSpPr>
+        <p:spPr/>
+        <p:txBody>
+          <a:bodyPr/>
+          <a:lstStyle/>
+          <a:p>
+            <a:r>
+              <a:rPr lang="en-GB" dirty="0" smtClean="0"/>
+              <a:t>The Evolve Toolset</a:t>
+            </a:r>
+            <a:endParaRPr lang="en-GB" dirty="0"/>
+          </a:p>
+        </p:txBody>
+      </p:sp>
+      <p:sp>
+        <p:nvSpPr>
+          <p:cNvPr id="5" name="Text Placeholder 4"/>
+          <p:cNvSpPr>
+            <a:spLocks noGrp="1"/>
+          </p:cNvSpPr>
+          <p:nvPr>
+            <p:ph type="body" idx="1"/>
+          </p:nvPr>
+        </p:nvSpPr>
+        <p:spPr/>
+        <p:txBody>
+          <a:bodyPr/>
+          <a:lstStyle/>
+          <a:p>
+            <a:r>
+              <a:rPr lang="en-GB" dirty="0" smtClean="0"/>
+              <a:t>Evolve in practice...</a:t>
+            </a:r>
+            <a:endParaRPr lang="en-GB" dirty="0"/>
+          </a:p>
+        </p:txBody>
+      </p:sp>
+    </p:spTree>
+  </p:cSld>
+  <p:clrMapOvr>
+    <a:masterClrMapping/>
+  </p:clrMapOvr>
+</p:sld>
+</file>
+
+<file path=ppt/slides/slide13.xml><?xml version="1.0" encoding="utf-8"?>
+<p:sld xmlns:a="http://schemas.openxmlformats.org/drawingml/2006/main" xmlns:r="http://schemas.openxmlformats.org/officeDocument/2006/relationships" xmlns:p="http://schemas.openxmlformats.org/presentationml/2006/main">
+  <p:cSld>
+    <p:spTree>
+      <p:nvGrpSpPr>
+        <p:cNvPr id="1" name=""/>
+        <p:cNvGrpSpPr/>
+        <p:nvPr/>
+      </p:nvGrpSpPr>
+      <p:grpSpPr>
+        <a:xfrm>
+          <a:off x="0" y="0"/>
+          <a:ext cx="0" cy="0"/>
+          <a:chOff x="0" y="0"/>
+          <a:chExt cx="0" cy="0"/>
+        </a:xfrm>
+      </p:grpSpPr>
+      <p:sp>
+        <p:nvSpPr>
+          <p:cNvPr id="4" name="Title 3"/>
+          <p:cNvSpPr>
+            <a:spLocks noGrp="1"/>
+          </p:cNvSpPr>
+          <p:nvPr>
+            <p:ph type="title"/>
+          </p:nvPr>
+        </p:nvSpPr>
+        <p:spPr/>
+        <p:txBody>
+          <a:bodyPr/>
+          <a:lstStyle/>
+          <a:p>
+            <a:r>
+              <a:rPr lang="en-GB" dirty="0" smtClean="0"/>
+              <a:t>Evolve</a:t>
+            </a:r>
+            <a:endParaRPr lang="en-GB" dirty="0"/>
+          </a:p>
+        </p:txBody>
+      </p:sp>
+      <p:sp>
+        <p:nvSpPr>
+          <p:cNvPr id="5" name="Content Placeholder 4"/>
+          <p:cNvSpPr>
+            <a:spLocks noGrp="1"/>
+          </p:cNvSpPr>
+          <p:nvPr>
+            <p:ph idx="1"/>
+          </p:nvPr>
+        </p:nvSpPr>
+        <p:spPr/>
+        <p:txBody>
+          <a:bodyPr/>
+          <a:lstStyle/>
+          <a:p>
+            <a:r>
+              <a:rPr lang="en-GB" dirty="0" smtClean="0"/>
+              <a:t>Creating stuff</a:t>
+            </a:r>
+          </a:p>
+          <a:p>
+            <a:r>
+              <a:rPr lang="en-GB" dirty="0" smtClean="0"/>
+              <a:t>Difference </a:t>
+            </a:r>
+            <a:r>
+              <a:rPr lang="en-GB" dirty="0" smtClean="0"/>
+              <a:t>creation &amp; browser</a:t>
+            </a:r>
+            <a:endParaRPr lang="en-GB" dirty="0" smtClean="0"/>
+          </a:p>
+          <a:p>
+            <a:r>
+              <a:rPr lang="en-GB" dirty="0" smtClean="0"/>
+              <a:t>Combination </a:t>
+            </a:r>
+            <a:r>
+              <a:rPr lang="en-GB" dirty="0" smtClean="0"/>
+              <a:t>checking</a:t>
+            </a:r>
+          </a:p>
+          <a:p>
+            <a:r>
+              <a:rPr lang="en-GB" dirty="0" smtClean="0"/>
+              <a:t>Importing and exporting models</a:t>
+            </a:r>
+          </a:p>
+          <a:p>
+            <a:r>
+              <a:rPr lang="en-GB" dirty="0" smtClean="0"/>
+              <a:t>Importing beans</a:t>
+            </a:r>
+          </a:p>
+          <a:p>
+            <a:r>
+              <a:rPr lang="en-GB" dirty="0" smtClean="0"/>
+              <a:t>Generating Java code + fwd </a:t>
+            </a:r>
+            <a:r>
+              <a:rPr lang="en-GB" dirty="0" smtClean="0"/>
+              <a:t>engineering (2 types)</a:t>
+            </a:r>
+            <a:endParaRPr lang="en-GB" dirty="0" smtClean="0"/>
+          </a:p>
+          <a:p>
+            <a:r>
+              <a:rPr lang="en-GB" dirty="0" smtClean="0"/>
+              <a:t>Model scalability – lessons from UML tools</a:t>
+            </a:r>
+          </a:p>
+          <a:p>
+            <a:r>
+              <a:rPr lang="en-GB" dirty="0" smtClean="0"/>
+              <a:t>Team </a:t>
+            </a:r>
+            <a:r>
+              <a:rPr lang="en-GB" dirty="0" smtClean="0"/>
+              <a:t>edition</a:t>
+            </a:r>
+          </a:p>
+          <a:p>
+            <a:r>
+              <a:rPr lang="en-GB" dirty="0" smtClean="0"/>
+              <a:t>Internal architecture, interaction with Backbone</a:t>
+            </a:r>
+            <a:endParaRPr lang="en-GB" dirty="0" smtClean="0"/>
+          </a:p>
+        </p:txBody>
+      </p:sp>
+    </p:spTree>
+  </p:cSld>
+  <p:clrMapOvr>
+    <a:masterClrMapping/>
+  </p:clrMapOvr>
+</p:sld>
+</file>
+
+<file path=ppt/slides/slide14.xml><?xml version="1.0" encoding="utf-8"?>
+<p:sld xmlns:a="http://schemas.openxmlformats.org/drawingml/2006/main" xmlns:r="http://schemas.openxmlformats.org/officeDocument/2006/relationships" xmlns:p="http://schemas.openxmlformats.org/presentationml/2006/main">
+  <p:cSld>
+    <p:spTree>
+      <p:nvGrpSpPr>
+        <p:cNvPr id="1" name=""/>
+        <p:cNvGrpSpPr/>
+        <p:nvPr/>
+      </p:nvGrpSpPr>
+      <p:grpSpPr>
+        <a:xfrm>
+          <a:off x="0" y="0"/>
+          <a:ext cx="0" cy="0"/>
+          <a:chOff x="0" y="0"/>
+          <a:chExt cx="0" cy="0"/>
+        </a:xfrm>
+      </p:grpSpPr>
+      <p:sp>
+        <p:nvSpPr>
+          <p:cNvPr id="4" name="Title 3"/>
+          <p:cNvSpPr>
+            <a:spLocks noGrp="1"/>
+          </p:cNvSpPr>
+          <p:nvPr>
+            <p:ph type="title"/>
+          </p:nvPr>
+        </p:nvSpPr>
+        <p:spPr/>
+        <p:txBody>
+          <a:bodyPr/>
+          <a:lstStyle/>
+          <a:p>
+            <a:r>
+              <a:rPr lang="en-GB" dirty="0" smtClean="0"/>
+              <a:t>Future Work</a:t>
+            </a:r>
+            <a:endParaRPr lang="en-GB" dirty="0"/>
+          </a:p>
+        </p:txBody>
+      </p:sp>
+      <p:sp>
+        <p:nvSpPr>
+          <p:cNvPr id="5" name="Text Placeholder 4"/>
+          <p:cNvSpPr>
+            <a:spLocks noGrp="1"/>
+          </p:cNvSpPr>
+          <p:nvPr>
+            <p:ph type="body" idx="1"/>
+          </p:nvPr>
+        </p:nvSpPr>
+        <p:spPr/>
+        <p:txBody>
+          <a:bodyPr/>
+          <a:lstStyle/>
+          <a:p>
+            <a:r>
+              <a:rPr lang="en-GB" dirty="0" smtClean="0"/>
+              <a:t>Capabilities and challenges</a:t>
+            </a:r>
+            <a:endParaRPr lang="en-GB" dirty="0"/>
+          </a:p>
+        </p:txBody>
+      </p:sp>
+    </p:spTree>
+  </p:cSld>
+  <p:clrMapOvr>
+    <a:masterClrMapping/>
+  </p:clrMapOvr>
+</p:sld>
+</file>
+
+<file path=ppt/slides/slide15.xml><?xml version="1.0" encoding="utf-8"?>
+<p:sld xmlns:a="http://schemas.openxmlformats.org/drawingml/2006/main" xmlns:r="http://schemas.openxmlformats.org/officeDocument/2006/relationships" xmlns:p="http://schemas.openxmlformats.org/presentationml/2006/main">
+  <p:cSld>
+    <p:spTree>
+      <p:nvGrpSpPr>
+        <p:cNvPr id="1" name=""/>
+        <p:cNvGrpSpPr/>
+        <p:nvPr/>
+      </p:nvGrpSpPr>
+      <p:grpSpPr>
+        <a:xfrm>
+          <a:off x="0" y="0"/>
+          <a:ext cx="0" cy="0"/>
+          <a:chOff x="0" y="0"/>
+          <a:chExt cx="0" cy="0"/>
+        </a:xfrm>
+      </p:grpSpPr>
+      <p:sp>
+        <p:nvSpPr>
+          <p:cNvPr id="2" name="Title 1"/>
+          <p:cNvSpPr>
+            <a:spLocks noGrp="1"/>
+          </p:cNvSpPr>
+          <p:nvPr>
+            <p:ph type="title"/>
+          </p:nvPr>
+        </p:nvSpPr>
+        <p:spPr/>
+        <p:txBody>
+          <a:bodyPr/>
+          <a:lstStyle/>
+          <a:p>
+            <a:r>
+              <a:rPr lang="en-GB" dirty="0" smtClean="0"/>
+              <a:t>Extensible protocols</a:t>
+            </a:r>
+            <a:endParaRPr lang="en-GB" dirty="0"/>
+          </a:p>
+        </p:txBody>
+      </p:sp>
+      <p:sp>
+        <p:nvSpPr>
+          <p:cNvPr id="3" name="Content Placeholder 2"/>
+          <p:cNvSpPr>
+            <a:spLocks noGrp="1"/>
+          </p:cNvSpPr>
+          <p:nvPr>
+            <p:ph idx="1"/>
+          </p:nvPr>
+        </p:nvSpPr>
+        <p:spPr/>
+        <p:txBody>
+          <a:bodyPr/>
+          <a:lstStyle/>
+          <a:p>
+            <a:r>
+              <a:rPr lang="en-GB" dirty="0" smtClean="0"/>
+              <a:t>Based on protocols [</a:t>
+            </a:r>
+            <a:r>
+              <a:rPr lang="en-GB" dirty="0" err="1" smtClean="0"/>
+              <a:t>plasil</a:t>
+            </a:r>
+            <a:r>
+              <a:rPr lang="en-GB" dirty="0" smtClean="0"/>
+              <a:t>]</a:t>
+            </a:r>
+          </a:p>
+          <a:p>
+            <a:r>
+              <a:rPr lang="en-GB" dirty="0" smtClean="0"/>
+              <a:t>Aim: allow extension to enforce semantic guarantees</a:t>
+            </a:r>
+          </a:p>
+          <a:p>
+            <a:r>
+              <a:rPr lang="en-GB" dirty="0" smtClean="0"/>
+              <a:t>Sequence diagram, ports are actors</a:t>
+            </a:r>
+          </a:p>
+          <a:p>
+            <a:pPr lvl="1"/>
+            <a:r>
+              <a:rPr lang="en-GB" dirty="0" smtClean="0"/>
+              <a:t>Convert to LTS or another state transition system</a:t>
+            </a:r>
+          </a:p>
+          <a:p>
+            <a:pPr lvl="1"/>
+            <a:r>
+              <a:rPr lang="en-GB" dirty="0" smtClean="0"/>
+              <a:t>Need to find a way to allow extension to “extend”</a:t>
+            </a:r>
+          </a:p>
+          <a:p>
+            <a:pPr lvl="1"/>
+            <a:endParaRPr lang="en-GB" dirty="0"/>
+          </a:p>
+        </p:txBody>
+      </p:sp>
+    </p:spTree>
+  </p:cSld>
+  <p:clrMapOvr>
+    <a:masterClrMapping/>
+  </p:clrMapOvr>
+</p:sld>
+</file>
+
+<file path=ppt/slides/slide16.xml><?xml version="1.0" encoding="utf-8"?>
+<p:sld xmlns:a="http://schemas.openxmlformats.org/drawingml/2006/main" xmlns:r="http://schemas.openxmlformats.org/officeDocument/2006/relationships" xmlns:p="http://schemas.openxmlformats.org/presentationml/2006/main">
+  <p:cSld>
+    <p:spTree>
+      <p:nvGrpSpPr>
+        <p:cNvPr id="1" name=""/>
+        <p:cNvGrpSpPr/>
+        <p:nvPr/>
+      </p:nvGrpSpPr>
+      <p:grpSpPr>
+        <a:xfrm>
+          <a:off x="0" y="0"/>
+          <a:ext cx="0" cy="0"/>
+          <a:chOff x="0" y="0"/>
+          <a:chExt cx="0" cy="0"/>
+        </a:xfrm>
+      </p:grpSpPr>
+      <p:sp>
+        <p:nvSpPr>
+          <p:cNvPr id="2" name="Title 1"/>
+          <p:cNvSpPr>
+            <a:spLocks noGrp="1"/>
+          </p:cNvSpPr>
+          <p:nvPr>
+            <p:ph type="title"/>
+          </p:nvPr>
+        </p:nvSpPr>
+        <p:spPr/>
+        <p:txBody>
+          <a:bodyPr/>
+          <a:lstStyle/>
+          <a:p>
+            <a:r>
+              <a:rPr lang="en-GB" dirty="0" smtClean="0"/>
+              <a:t>Extensible protocols (2)</a:t>
+            </a:r>
+            <a:endParaRPr lang="en-GB" dirty="0"/>
+          </a:p>
+        </p:txBody>
+      </p:sp>
+      <p:sp>
+        <p:nvSpPr>
+          <p:cNvPr id="3" name="Content Placeholder 2"/>
+          <p:cNvSpPr>
+            <a:spLocks noGrp="1"/>
+          </p:cNvSpPr>
+          <p:nvPr>
+            <p:ph idx="1"/>
+          </p:nvPr>
+        </p:nvSpPr>
+        <p:spPr/>
+        <p:txBody>
+          <a:bodyPr/>
+          <a:lstStyle/>
+          <a:p>
+            <a:endParaRPr lang="en-GB" dirty="0"/>
+          </a:p>
+        </p:txBody>
+      </p:sp>
+    </p:spTree>
+  </p:cSld>
+  <p:clrMapOvr>
+    <a:masterClrMapping/>
+  </p:clrMapOvr>
+</p:sld>
+</file>
+
+<file path=ppt/slides/slide17.xml><?xml version="1.0" encoding="utf-8"?>
+<p:sld xmlns:a="http://schemas.openxmlformats.org/drawingml/2006/main" xmlns:r="http://schemas.openxmlformats.org/officeDocument/2006/relationships" xmlns:p="http://schemas.openxmlformats.org/presentationml/2006/main">
+  <p:cSld>
+    <p:spTree>
+      <p:nvGrpSpPr>
+        <p:cNvPr id="1" name=""/>
+        <p:cNvGrpSpPr/>
+        <p:nvPr/>
+      </p:nvGrpSpPr>
+      <p:grpSpPr>
+        <a:xfrm>
+          <a:off x="0" y="0"/>
+          <a:ext cx="0" cy="0"/>
+          <a:chOff x="0" y="0"/>
+          <a:chExt cx="0" cy="0"/>
+        </a:xfrm>
+      </p:grpSpPr>
+      <p:sp>
+        <p:nvSpPr>
+          <p:cNvPr id="2" name="Title 1"/>
+          <p:cNvSpPr>
+            <a:spLocks noGrp="1"/>
+          </p:cNvSpPr>
+          <p:nvPr>
+            <p:ph type="title"/>
+          </p:nvPr>
+        </p:nvSpPr>
+        <p:spPr/>
+        <p:txBody>
+          <a:bodyPr/>
+          <a:lstStyle/>
+          <a:p>
+            <a:r>
+              <a:rPr lang="en-GB" dirty="0" smtClean="0"/>
+              <a:t>Backwards compatibility</a:t>
+            </a:r>
+            <a:endParaRPr lang="en-GB" dirty="0"/>
+          </a:p>
+        </p:txBody>
+      </p:sp>
+      <p:sp>
+        <p:nvSpPr>
+          <p:cNvPr id="3" name="Content Placeholder 2"/>
+          <p:cNvSpPr>
+            <a:spLocks noGrp="1"/>
+          </p:cNvSpPr>
+          <p:nvPr>
+            <p:ph idx="1"/>
+          </p:nvPr>
+        </p:nvSpPr>
+        <p:spPr/>
+        <p:txBody>
+          <a:bodyPr/>
+          <a:lstStyle/>
+          <a:p>
+            <a:r>
+              <a:rPr lang="en-GB" dirty="0" smtClean="0"/>
+              <a:t>Reverse dependencies</a:t>
+            </a:r>
+          </a:p>
+          <a:p>
+            <a:pPr lvl="1"/>
+            <a:r>
+              <a:rPr lang="en-GB" dirty="0" smtClean="0"/>
+              <a:t>Compresses </a:t>
+            </a:r>
+            <a:r>
+              <a:rPr lang="en-GB" dirty="0" smtClean="0"/>
+              <a:t>deltas</a:t>
+            </a:r>
+          </a:p>
+          <a:p>
+            <a:pPr lvl="1"/>
+            <a:r>
+              <a:rPr lang="en-GB" dirty="0" smtClean="0"/>
+              <a:t>Older systems are now deltas against newer system</a:t>
+            </a:r>
+          </a:p>
+        </p:txBody>
+      </p:sp>
+    </p:spTree>
+  </p:cSld>
+  <p:clrMapOvr>
+    <a:masterClrMapping/>
+  </p:clrMapOvr>
+</p:sld>
+</file>
+
+<file path=ppt/slides/slide18.xml><?xml version="1.0" encoding="utf-8"?>
+<p:sld xmlns:a="http://schemas.openxmlformats.org/drawingml/2006/main" xmlns:r="http://schemas.openxmlformats.org/officeDocument/2006/relationships" xmlns:p="http://schemas.openxmlformats.org/presentationml/2006/main">
+  <p:cSld>
+    <p:spTree>
+      <p:nvGrpSpPr>
+        <p:cNvPr id="1" name=""/>
+        <p:cNvGrpSpPr/>
+        <p:nvPr/>
+      </p:nvGrpSpPr>
+      <p:grpSpPr>
+        <a:xfrm>
+          <a:off x="0" y="0"/>
+          <a:ext cx="0" cy="0"/>
+          <a:chOff x="0" y="0"/>
+          <a:chExt cx="0" cy="0"/>
+        </a:xfrm>
+      </p:grpSpPr>
+      <p:sp>
+        <p:nvSpPr>
+          <p:cNvPr id="2" name="Title 1"/>
+          <p:cNvSpPr>
+            <a:spLocks noGrp="1"/>
+          </p:cNvSpPr>
+          <p:nvPr>
+            <p:ph type="title"/>
+          </p:nvPr>
+        </p:nvSpPr>
+        <p:spPr/>
+        <p:txBody>
+          <a:bodyPr>
+            <a:normAutofit/>
+          </a:bodyPr>
+          <a:lstStyle/>
+          <a:p>
+            <a:r>
+              <a:rPr lang="en-GB" dirty="0" smtClean="0"/>
+              <a:t>Replacement for </a:t>
+            </a:r>
+            <a:r>
+              <a:rPr lang="en-GB" dirty="0" err="1" smtClean="0"/>
+              <a:t>plugin</a:t>
+            </a:r>
+            <a:r>
+              <a:rPr lang="en-GB" dirty="0" smtClean="0"/>
+              <a:t> approach</a:t>
+            </a:r>
+            <a:endParaRPr lang="en-GB" dirty="0"/>
+          </a:p>
+        </p:txBody>
+      </p:sp>
+      <p:sp>
+        <p:nvSpPr>
+          <p:cNvPr id="3" name="Content Placeholder 2"/>
+          <p:cNvSpPr>
+            <a:spLocks noGrp="1"/>
+          </p:cNvSpPr>
+          <p:nvPr>
+            <p:ph idx="1"/>
+          </p:nvPr>
+        </p:nvSpPr>
+        <p:spPr/>
+        <p:txBody>
+          <a:bodyPr/>
+          <a:lstStyle/>
+          <a:p>
+            <a:endParaRPr lang="en-GB"/>
+          </a:p>
+        </p:txBody>
+      </p:sp>
+    </p:spTree>
+  </p:cSld>
+  <p:clrMapOvr>
+    <a:masterClrMapping/>
+  </p:clrMapOvr>
+</p:sld>
+</file>
+
+<file path=ppt/slides/slide19.xml><?xml version="1.0" encoding="utf-8"?>
+<p:sld xmlns:a="http://schemas.openxmlformats.org/drawingml/2006/main" xmlns:r="http://schemas.openxmlformats.org/officeDocument/2006/relationships" xmlns:p="http://schemas.openxmlformats.org/presentationml/2006/main">
+  <p:cSld>
+    <p:spTree>
+      <p:nvGrpSpPr>
+        <p:cNvPr id="1" name=""/>
+        <p:cNvGrpSpPr/>
+        <p:nvPr/>
+      </p:nvGrpSpPr>
+      <p:grpSpPr>
+        <a:xfrm>
+          <a:off x="0" y="0"/>
+          <a:ext cx="0" cy="0"/>
+          <a:chOff x="0" y="0"/>
+          <a:chExt cx="0" cy="0"/>
+        </a:xfrm>
+      </p:grpSpPr>
+      <p:sp>
+        <p:nvSpPr>
+          <p:cNvPr id="2" name="Title 1"/>
+          <p:cNvSpPr>
+            <a:spLocks noGrp="1"/>
+          </p:cNvSpPr>
+          <p:nvPr>
+            <p:ph type="title"/>
+          </p:nvPr>
+        </p:nvSpPr>
+        <p:spPr/>
+        <p:txBody>
+          <a:bodyPr/>
+          <a:lstStyle/>
+          <a:p>
+            <a:r>
+              <a:rPr lang="en-GB" dirty="0" smtClean="0"/>
+              <a:t>Applying to Android</a:t>
+            </a:r>
+            <a:endParaRPr lang="en-GB" dirty="0"/>
+          </a:p>
+        </p:txBody>
+      </p:sp>
+      <p:sp>
+        <p:nvSpPr>
+          <p:cNvPr id="3" name="Content Placeholder 2"/>
+          <p:cNvSpPr>
+            <a:spLocks noGrp="1"/>
+          </p:cNvSpPr>
+          <p:nvPr>
+            <p:ph idx="1"/>
+          </p:nvPr>
+        </p:nvSpPr>
+        <p:spPr/>
+        <p:txBody>
+          <a:bodyPr/>
+          <a:lstStyle/>
+          <a:p>
+            <a:endParaRPr lang="en-GB"/>
+          </a:p>
+        </p:txBody>
+      </p:sp>
+    </p:spTree>
+  </p:cSld>
+  <p:clrMapOvr>
+    <a:masterClrMapping/>
+  </p:clrMapOvr>
 </p:sld>
 </file>
 
@@ -4137,17 +5276,13 @@
         <p:spPr/>
         <p:txBody>
           <a:bodyPr>
-            <a:normAutofit fontScale="92500" lnSpcReduction="20000"/>
+            <a:normAutofit/>
           </a:bodyPr>
           <a:lstStyle/>
           <a:p>
             <a:r>
               <a:rPr lang="en-GB" dirty="0" smtClean="0"/>
-              <a:t>Overview of the formal </a:t>
-            </a:r>
-            <a:r>
-              <a:rPr lang="en-GB" dirty="0" smtClean="0"/>
-              <a:t>model</a:t>
+              <a:t>Overview of the formal model</a:t>
             </a:r>
           </a:p>
           <a:p>
@@ -4184,32 +5319,10 @@
           <a:p>
             <a:r>
               <a:rPr lang="en-GB" dirty="0" smtClean="0"/>
-              <a:t>The Evolve Toolset</a:t>
-            </a:r>
-          </a:p>
-          <a:p>
-            <a:pPr lvl="1"/>
-            <a:r>
-              <a:rPr lang="en-GB" dirty="0" smtClean="0"/>
-              <a:t>Creating Java programs with Evolve</a:t>
-            </a:r>
-          </a:p>
-          <a:p>
-            <a:pPr lvl="1"/>
-            <a:r>
-              <a:rPr lang="en-GB" dirty="0" smtClean="0"/>
-              <a:t>Handling large models</a:t>
-            </a:r>
-          </a:p>
-          <a:p>
-            <a:pPr lvl="1"/>
-            <a:r>
-              <a:rPr lang="en-GB" dirty="0" smtClean="0"/>
-              <a:t>A team approach</a:t>
-            </a:r>
-          </a:p>
-          <a:p>
-            <a:pPr lvl="1"/>
+              <a:t>The Evolve toolset</a:t>
+            </a:r>
+          </a:p>
+          <a:p>
             <a:endParaRPr lang="en-GB" dirty="0" smtClean="0"/>
           </a:p>
           <a:p>
@@ -4374,11 +5487,7 @@
             </a:pPr>
             <a:r>
               <a:rPr lang="en-GB" dirty="0" smtClean="0"/>
-              <a:t>[explain that graph can be reworked at any level because elements are inserted into the expanded graph – maybe 3 slides + 1 alloy</a:t>
-            </a:r>
-            <a:r>
-              <a:rPr lang="en-GB" dirty="0" smtClean="0"/>
-              <a:t>]</a:t>
+              <a:t>[explain that graph can be reworked at any level because elements are inserted into the expanded graph – maybe 3 slides + 1 alloy]</a:t>
             </a:r>
           </a:p>
           <a:p>
@@ -4589,7 +5698,11 @@
           <a:bodyPr/>
           <a:lstStyle/>
           <a:p>
-            <a:endParaRPr lang="en-GB"/>
+            <a:r>
+              <a:rPr lang="en-GB" dirty="0" smtClean="0"/>
+              <a:t>Inferring port types</a:t>
+            </a:r>
+            <a:endParaRPr lang="en-GB" dirty="0"/>
           </a:p>
         </p:txBody>
       </p:sp>
@@ -4610,19 +5723,29 @@
           <a:p>
             <a:r>
               <a:rPr lang="en-GB" dirty="0" smtClean="0"/>
-              <a:t>Importing beans</a:t>
-            </a:r>
-          </a:p>
-          <a:p>
-            <a:r>
-              <a:rPr lang="en-GB" dirty="0" smtClean="0"/>
-              <a:t>Associating implementation classes + interfaces</a:t>
-            </a:r>
-          </a:p>
-          <a:p>
-            <a:endParaRPr lang="en-GB" dirty="0" smtClean="0"/>
-          </a:p>
-          <a:p>
+              <a:t>Why do it?</a:t>
+            </a:r>
+          </a:p>
+          <a:p>
+            <a:pPr lvl="1"/>
+            <a:r>
+              <a:rPr lang="en-GB" dirty="0" smtClean="0"/>
+              <a:t>Propagates local changes globally without further deltas</a:t>
+            </a:r>
+          </a:p>
+          <a:p>
+            <a:pPr lvl="1"/>
+            <a:r>
+              <a:rPr lang="en-GB" dirty="0" smtClean="0"/>
+              <a:t>Exposes interfaces on surface back to surface</a:t>
+            </a:r>
+          </a:p>
+          <a:p>
+            <a:pPr lvl="1"/>
+            <a:r>
+              <a:rPr lang="en-GB" dirty="0" smtClean="0"/>
+              <a:t>Intuitive</a:t>
+            </a:r>
             <a:endParaRPr lang="en-GB" dirty="0"/>
           </a:p>
         </p:txBody>
@@ -4664,12 +5787,18 @@
         </p:nvSpPr>
         <p:spPr/>
         <p:txBody>
-          <a:bodyPr/>
-          <a:lstStyle/>
-          <a:p>
-            <a:r>
-              <a:rPr lang="en-GB" dirty="0" smtClean="0"/>
-              <a:t>The Evolve Toolset</a:t>
+          <a:bodyPr>
+            <a:normAutofit fontScale="90000"/>
+          </a:bodyPr>
+          <a:lstStyle/>
+          <a:p>
+            <a:r>
+              <a:rPr lang="en-GB" dirty="0" err="1" smtClean="0"/>
+              <a:t>Hyperports</a:t>
+            </a:r>
+            <a:r>
+              <a:rPr lang="en-GB" dirty="0" smtClean="0"/>
+              <a:t>: Cutting through the hierarchy</a:t>
             </a:r>
             <a:endParaRPr lang="en-GB" dirty="0"/>
           </a:p>
@@ -4677,12 +5806,12 @@
       </p:sp>
       <p:sp>
         <p:nvSpPr>
-          <p:cNvPr id="5" name="Text Placeholder 4"/>
-          <p:cNvSpPr>
-            <a:spLocks noGrp="1"/>
-          </p:cNvSpPr>
-          <p:nvPr>
-            <p:ph type="body" idx="1"/>
+          <p:cNvPr id="5" name="Content Placeholder 4"/>
+          <p:cNvSpPr>
+            <a:spLocks noGrp="1"/>
+          </p:cNvSpPr>
+          <p:nvPr>
+            <p:ph idx="1"/>
           </p:nvPr>
         </p:nvSpPr>
         <p:spPr/>
@@ -4692,7 +5821,14 @@
           <a:p>
             <a:r>
               <a:rPr lang="en-GB" dirty="0" smtClean="0"/>
-              <a:t>Evolve in practice...</a:t>
+              <a:t>Singleton can use this</a:t>
+            </a:r>
+          </a:p>
+          <a:p>
+            <a:pPr lvl="1"/>
+            <a:r>
+              <a:rPr lang="en-GB" dirty="0" smtClean="0"/>
+              <a:t>Much more general</a:t>
             </a:r>
             <a:endParaRPr lang="en-GB" dirty="0"/>
           </a:p>
@@ -4740,7 +5876,7 @@
           <a:p>
             <a:r>
               <a:rPr lang="en-GB" dirty="0" smtClean="0"/>
-              <a:t>Evolve</a:t>
+              <a:t>Alphanumeric indices</a:t>
             </a:r>
             <a:endParaRPr lang="en-GB" dirty="0"/>
           </a:p>
@@ -4763,65 +5899,30 @@
           <a:p>
             <a:r>
               <a:rPr lang="en-GB" dirty="0" smtClean="0"/>
-              <a:t>Creating stuff</a:t>
-            </a:r>
-          </a:p>
-          <a:p>
-            <a:r>
-              <a:rPr lang="en-GB" dirty="0" smtClean="0"/>
-              <a:t>Difference creation</a:t>
-            </a:r>
-          </a:p>
-          <a:p>
-            <a:r>
-              <a:rPr lang="en-GB" dirty="0" smtClean="0"/>
-              <a:t>Browser</a:t>
-            </a:r>
-          </a:p>
-          <a:p>
-            <a:r>
-              <a:rPr lang="en-GB" dirty="0" smtClean="0"/>
-              <a:t>Combination checking</a:t>
-            </a:r>
-          </a:p>
-          <a:p>
-            <a:r>
-              <a:rPr lang="en-GB" dirty="0" smtClean="0"/>
-              <a:t>Importing and exporting models</a:t>
-            </a:r>
-          </a:p>
-          <a:p>
-            <a:r>
-              <a:rPr lang="en-GB" dirty="0" smtClean="0"/>
-              <a:t>Importing beans</a:t>
-            </a:r>
-          </a:p>
-          <a:p>
-            <a:r>
-              <a:rPr lang="en-GB" dirty="0" smtClean="0"/>
-              <a:t>Generating Java code + fwd engineering</a:t>
-            </a:r>
-          </a:p>
-          <a:p>
-            <a:r>
-              <a:rPr lang="en-GB" dirty="0" smtClean="0"/>
-              <a:t>Model s</a:t>
-            </a:r>
-            <a:r>
-              <a:rPr lang="en-GB" dirty="0" smtClean="0"/>
-              <a:t>calability </a:t>
-            </a:r>
-            <a:r>
-              <a:rPr lang="en-GB" smtClean="0"/>
-              <a:t>– lessons from UML tools</a:t>
-            </a:r>
+              <a:t>Allows an extension to always insert between existing</a:t>
+            </a:r>
+          </a:p>
+          <a:p>
+            <a:pPr lvl="1"/>
+            <a:r>
+              <a:rPr lang="en-GB" dirty="0" smtClean="0"/>
+              <a:t>Lexical ordering</a:t>
+            </a:r>
+          </a:p>
+          <a:p>
+            <a:pPr lvl="1"/>
+            <a:r>
+              <a:rPr lang="en-GB" dirty="0" smtClean="0"/>
+              <a:t>Like line numbers in BASIC ;-)</a:t>
+            </a:r>
+          </a:p>
+          <a:p>
+            <a:pPr lvl="1"/>
             <a:endParaRPr lang="en-GB" dirty="0" smtClean="0"/>
           </a:p>
           <a:p>
-            <a:r>
-              <a:rPr lang="en-GB" dirty="0" smtClean="0"/>
-              <a:t>Team edition</a:t>
-            </a:r>
+            <a:pPr lvl="1"/>
+            <a:endParaRPr lang="en-GB" dirty="0"/>
           </a:p>
         </p:txBody>
       </p:sp>
@@ -4852,7 +5953,7 @@
       </p:grpSpPr>
       <p:sp>
         <p:nvSpPr>
-          <p:cNvPr id="2" name="Title 1"/>
+          <p:cNvPr id="4" name="Title 3"/>
           <p:cNvSpPr>
             <a:spLocks noGrp="1"/>
           </p:cNvSpPr>
@@ -4867,7 +5968,7 @@
           <a:p>
             <a:r>
               <a:rPr lang="en-GB" dirty="0" smtClean="0"/>
-              <a:t>Future Work</a:t>
+              <a:t>Factories</a:t>
             </a:r>
             <a:endParaRPr lang="en-GB" dirty="0"/>
           </a:p>
@@ -4875,7 +5976,7 @@
       </p:sp>
       <p:sp>
         <p:nvSpPr>
-          <p:cNvPr id="3" name="Content Placeholder 2"/>
+          <p:cNvPr id="5" name="Content Placeholder 4"/>
           <p:cNvSpPr>
             <a:spLocks noGrp="1"/>
           </p:cNvSpPr>
@@ -4890,92 +5991,29 @@
           <a:p>
             <a:r>
               <a:rPr lang="en-GB" dirty="0" smtClean="0"/>
-              <a:t>Extensible protocols [</a:t>
-            </a:r>
-            <a:r>
-              <a:rPr lang="en-GB" dirty="0" err="1" smtClean="0"/>
-              <a:t>plasil</a:t>
-            </a:r>
-            <a:r>
-              <a:rPr lang="en-GB" dirty="0" smtClean="0"/>
-              <a:t>] + goal checking</a:t>
+              <a:t>Components with lazily instantiated insides [DARWIN]</a:t>
             </a:r>
           </a:p>
           <a:p>
             <a:pPr lvl="1"/>
             <a:r>
               <a:rPr lang="en-GB" dirty="0" smtClean="0"/>
-              <a:t>Does extension violate behavioural assumptions?</a:t>
+              <a:t>Use with resemblance and evolution</a:t>
             </a:r>
           </a:p>
           <a:p>
             <a:pPr lvl="1"/>
-            <a:endParaRPr lang="en-GB" dirty="0" smtClean="0"/>
-          </a:p>
-          <a:p>
-            <a:r>
-              <a:rPr lang="en-GB" dirty="0" smtClean="0"/>
-              <a:t>Backwards compatibility: </a:t>
-            </a:r>
-            <a:r>
-              <a:rPr lang="en-GB" smtClean="0"/>
-              <a:t>reversing dependencies</a:t>
-            </a:r>
-            <a:endParaRPr lang="en-GB" dirty="0" smtClean="0"/>
+            <a:r>
+              <a:rPr lang="en-GB" dirty="0" smtClean="0"/>
+              <a:t>Can be nested arbitrarily</a:t>
+            </a:r>
           </a:p>
           <a:p>
             <a:pPr lvl="1"/>
-            <a:endParaRPr lang="en-GB" dirty="0" smtClean="0"/>
-          </a:p>
-          <a:p>
-            <a:r>
-              <a:rPr lang="en-GB" dirty="0" smtClean="0"/>
-              <a:t>Replacement for </a:t>
-            </a:r>
-            <a:r>
-              <a:rPr lang="en-GB" dirty="0" err="1" smtClean="0"/>
-              <a:t>Plugin</a:t>
-            </a:r>
-            <a:r>
-              <a:rPr lang="en-GB" dirty="0" smtClean="0"/>
-              <a:t> Approach</a:t>
-            </a:r>
-          </a:p>
-          <a:p>
-            <a:pPr lvl="1"/>
-            <a:r>
-              <a:rPr lang="en-GB" dirty="0" smtClean="0"/>
-              <a:t>Internet-based distribution</a:t>
-            </a:r>
-          </a:p>
-          <a:p>
-            <a:pPr lvl="1"/>
-            <a:r>
-              <a:rPr lang="en-GB" dirty="0" smtClean="0"/>
-              <a:t>Runtime application + state transfer</a:t>
-            </a:r>
-          </a:p>
-          <a:p>
-            <a:pPr lvl="1"/>
-            <a:endParaRPr lang="en-GB" dirty="0" smtClean="0"/>
-          </a:p>
-          <a:p>
-            <a:r>
-              <a:rPr lang="en-GB" dirty="0" smtClean="0"/>
-              <a:t>Team version of Evolve</a:t>
-            </a:r>
-          </a:p>
-          <a:p>
-            <a:pPr lvl="1"/>
-            <a:endParaRPr lang="en-GB" dirty="0" smtClean="0"/>
-          </a:p>
-          <a:p>
-            <a:endParaRPr lang="en-GB" dirty="0" smtClean="0"/>
-          </a:p>
-          <a:p>
-            <a:endParaRPr lang="en-GB" dirty="0" smtClean="0"/>
-          </a:p>
-          <a:p>
+            <a:r>
+              <a:rPr lang="en-GB" dirty="0" smtClean="0"/>
+              <a:t>Dynamic architecture in static description</a:t>
+            </a:r>
             <a:endParaRPr lang="en-GB" dirty="0"/>
           </a:p>
         </p:txBody>

</xml_diff>